<commit_message>
1. Using SASS, Header and Footer Publishing completed, step to proceed ProjectSubContents. 2. I have updated the Excel document that summarizes the publishing rules in the 2018 portfolio, and summarizes the data on the submenu of the project menu.
</commit_message>
<xml_diff>
--- a/02_2018portfolio/00_plan/portfolio_jschoi.pptx
+++ b/02_2018portfolio/00_plan/portfolio_jschoi.pptx
@@ -253,7 +253,7 @@
           <a:p>
             <a:fld id="{3518E992-0E41-4333-8563-B1CF6B3E22C3}" type="datetimeFigureOut">
               <a:rPr lang="ko-KR" altLang="en-US" smtClean="0"/>
-              <a:t>2017-12-17</a:t>
+              <a:t>2017-12-26</a:t>
             </a:fld>
             <a:endParaRPr lang="ko-KR" altLang="en-US"/>
           </a:p>
@@ -423,7 +423,7 @@
           <a:p>
             <a:fld id="{3518E992-0E41-4333-8563-B1CF6B3E22C3}" type="datetimeFigureOut">
               <a:rPr lang="ko-KR" altLang="en-US" smtClean="0"/>
-              <a:t>2017-12-17</a:t>
+              <a:t>2017-12-26</a:t>
             </a:fld>
             <a:endParaRPr lang="ko-KR" altLang="en-US"/>
           </a:p>
@@ -603,7 +603,7 @@
           <a:p>
             <a:fld id="{3518E992-0E41-4333-8563-B1CF6B3E22C3}" type="datetimeFigureOut">
               <a:rPr lang="ko-KR" altLang="en-US" smtClean="0"/>
-              <a:t>2017-12-17</a:t>
+              <a:t>2017-12-26</a:t>
             </a:fld>
             <a:endParaRPr lang="ko-KR" altLang="en-US"/>
           </a:p>
@@ -773,7 +773,7 @@
           <a:p>
             <a:fld id="{3518E992-0E41-4333-8563-B1CF6B3E22C3}" type="datetimeFigureOut">
               <a:rPr lang="ko-KR" altLang="en-US" smtClean="0"/>
-              <a:t>2017-12-17</a:t>
+              <a:t>2017-12-26</a:t>
             </a:fld>
             <a:endParaRPr lang="ko-KR" altLang="en-US"/>
           </a:p>
@@ -1019,7 +1019,7 @@
           <a:p>
             <a:fld id="{3518E992-0E41-4333-8563-B1CF6B3E22C3}" type="datetimeFigureOut">
               <a:rPr lang="ko-KR" altLang="en-US" smtClean="0"/>
-              <a:t>2017-12-17</a:t>
+              <a:t>2017-12-26</a:t>
             </a:fld>
             <a:endParaRPr lang="ko-KR" altLang="en-US"/>
           </a:p>
@@ -1251,7 +1251,7 @@
           <a:p>
             <a:fld id="{3518E992-0E41-4333-8563-B1CF6B3E22C3}" type="datetimeFigureOut">
               <a:rPr lang="ko-KR" altLang="en-US" smtClean="0"/>
-              <a:t>2017-12-17</a:t>
+              <a:t>2017-12-26</a:t>
             </a:fld>
             <a:endParaRPr lang="ko-KR" altLang="en-US"/>
           </a:p>
@@ -1618,7 +1618,7 @@
           <a:p>
             <a:fld id="{3518E992-0E41-4333-8563-B1CF6B3E22C3}" type="datetimeFigureOut">
               <a:rPr lang="ko-KR" altLang="en-US" smtClean="0"/>
-              <a:t>2017-12-17</a:t>
+              <a:t>2017-12-26</a:t>
             </a:fld>
             <a:endParaRPr lang="ko-KR" altLang="en-US"/>
           </a:p>
@@ -1736,7 +1736,7 @@
           <a:p>
             <a:fld id="{3518E992-0E41-4333-8563-B1CF6B3E22C3}" type="datetimeFigureOut">
               <a:rPr lang="ko-KR" altLang="en-US" smtClean="0"/>
-              <a:t>2017-12-17</a:t>
+              <a:t>2017-12-26</a:t>
             </a:fld>
             <a:endParaRPr lang="ko-KR" altLang="en-US"/>
           </a:p>
@@ -1831,7 +1831,7 @@
           <a:p>
             <a:fld id="{3518E992-0E41-4333-8563-B1CF6B3E22C3}" type="datetimeFigureOut">
               <a:rPr lang="ko-KR" altLang="en-US" smtClean="0"/>
-              <a:t>2017-12-17</a:t>
+              <a:t>2017-12-26</a:t>
             </a:fld>
             <a:endParaRPr lang="ko-KR" altLang="en-US"/>
           </a:p>
@@ -2108,7 +2108,7 @@
           <a:p>
             <a:fld id="{3518E992-0E41-4333-8563-B1CF6B3E22C3}" type="datetimeFigureOut">
               <a:rPr lang="ko-KR" altLang="en-US" smtClean="0"/>
-              <a:t>2017-12-17</a:t>
+              <a:t>2017-12-26</a:t>
             </a:fld>
             <a:endParaRPr lang="ko-KR" altLang="en-US"/>
           </a:p>
@@ -2361,7 +2361,7 @@
           <a:p>
             <a:fld id="{3518E992-0E41-4333-8563-B1CF6B3E22C3}" type="datetimeFigureOut">
               <a:rPr lang="ko-KR" altLang="en-US" smtClean="0"/>
-              <a:t>2017-12-17</a:t>
+              <a:t>2017-12-26</a:t>
             </a:fld>
             <a:endParaRPr lang="ko-KR" altLang="en-US"/>
           </a:p>
@@ -2574,7 +2574,7 @@
           <a:p>
             <a:fld id="{3518E992-0E41-4333-8563-B1CF6B3E22C3}" type="datetimeFigureOut">
               <a:rPr lang="ko-KR" altLang="en-US" smtClean="0"/>
-              <a:t>2017-12-17</a:t>
+              <a:t>2017-12-26</a:t>
             </a:fld>
             <a:endParaRPr lang="ko-KR" altLang="en-US"/>
           </a:p>
@@ -3124,11 +3124,7 @@
             </a:r>
             <a:r>
               <a:rPr lang="ko-KR" altLang="en-US" dirty="0" smtClean="0"/>
-              <a:t> </a:t>
-            </a:r>
-            <a:r>
-              <a:rPr lang="ko-KR" altLang="en-US" dirty="0" smtClean="0"/>
-              <a:t>설명 및 규칙</a:t>
+              <a:t> 설명 및 규칙</a:t>
             </a:r>
             <a:endParaRPr lang="ko-KR" altLang="en-US" dirty="0"/>
           </a:p>
@@ -3172,8 +3168,8 @@
         </p:nvSpPr>
         <p:spPr>
           <a:xfrm>
-            <a:off x="412845" y="181857"/>
-            <a:ext cx="10995660" cy="5355312"/>
+            <a:off x="412844" y="181857"/>
+            <a:ext cx="11675523" cy="7532831"/>
           </a:xfrm>
           <a:prstGeom prst="rect">
             <a:avLst/>
@@ -3186,387 +3182,861 @@
           </a:bodyPr>
           <a:lstStyle/>
           <a:p>
-            <a:r>
-              <a:rPr lang="en-US" altLang="ko-KR" sz="1900" dirty="0" smtClean="0"/>
-              <a:t>HTML </a:t>
-            </a:r>
-            <a:r>
-              <a:rPr lang="ko-KR" altLang="en-US" sz="1900" dirty="0" smtClean="0"/>
-              <a:t>설정</a:t>
-            </a:r>
-            <a:endParaRPr lang="en-US" altLang="ko-KR" sz="1900" dirty="0" smtClean="0"/>
-          </a:p>
-          <a:p>
-            <a:endParaRPr lang="en-US" altLang="ko-KR" sz="1900" dirty="0" smtClean="0"/>
-          </a:p>
-          <a:p>
-            <a:r>
-              <a:rPr lang="en-US" altLang="ko-KR" sz="1900" dirty="0" smtClean="0"/>
-              <a:t>1. </a:t>
-            </a:r>
-            <a:r>
-              <a:rPr lang="ko-KR" altLang="en-US" sz="1900" dirty="0" smtClean="0"/>
-              <a:t>모든 주석은 영문으로 한다</a:t>
-            </a:r>
-            <a:r>
-              <a:rPr lang="en-US" altLang="ko-KR" sz="1900" dirty="0" smtClean="0"/>
-              <a:t>. (Sass</a:t>
-            </a:r>
-            <a:r>
-              <a:rPr lang="ko-KR" altLang="en-US" sz="1900" dirty="0" smtClean="0"/>
-              <a:t>를 </a:t>
-            </a:r>
-            <a:r>
-              <a:rPr lang="en-US" altLang="ko-KR" sz="1900" dirty="0" smtClean="0"/>
-              <a:t>CSS</a:t>
-            </a:r>
-            <a:r>
-              <a:rPr lang="ko-KR" altLang="en-US" sz="1900" dirty="0" smtClean="0"/>
-              <a:t>로 </a:t>
-            </a:r>
-            <a:r>
-              <a:rPr lang="ko-KR" altLang="en-US" sz="1900" dirty="0" err="1" smtClean="0"/>
-              <a:t>컴파일시</a:t>
-            </a:r>
-            <a:r>
-              <a:rPr lang="ko-KR" altLang="en-US" sz="1900" dirty="0" smtClean="0"/>
-              <a:t> 발생되는 오류를 </a:t>
-            </a:r>
-            <a:r>
-              <a:rPr lang="ko-KR" altLang="en-US" sz="1900" dirty="0" err="1" smtClean="0"/>
-              <a:t>최소하</a:t>
-            </a:r>
-            <a:r>
-              <a:rPr lang="ko-KR" altLang="en-US" sz="1900" dirty="0" smtClean="0"/>
-              <a:t> 하기 위해</a:t>
-            </a:r>
-            <a:r>
-              <a:rPr lang="en-US" altLang="ko-KR" sz="1900" dirty="0" smtClean="0"/>
-              <a:t>.)</a:t>
-            </a:r>
-          </a:p>
-          <a:p>
-            <a:endParaRPr lang="en-US" altLang="ko-KR" sz="1900" dirty="0"/>
-          </a:p>
-          <a:p>
-            <a:r>
-              <a:rPr lang="en-US" altLang="ko-KR" sz="1900" dirty="0" smtClean="0"/>
-              <a:t>CSS </a:t>
-            </a:r>
-            <a:r>
-              <a:rPr lang="ko-KR" altLang="en-US" sz="1900" dirty="0" smtClean="0"/>
-              <a:t>설정</a:t>
-            </a:r>
-            <a:endParaRPr lang="en-US" altLang="ko-KR" sz="1900" dirty="0" smtClean="0"/>
-          </a:p>
-          <a:p>
-            <a:endParaRPr lang="en-US" altLang="ko-KR" sz="1900" dirty="0" smtClean="0"/>
+            <a:pPr>
+              <a:lnSpc>
+                <a:spcPct val="150000"/>
+              </a:lnSpc>
+            </a:pPr>
+            <a:r>
+              <a:rPr lang="ko-KR" altLang="en-US" sz="1500" dirty="0" smtClean="0"/>
+              <a:t>파일명 설정</a:t>
+            </a:r>
+            <a:endParaRPr lang="en-US" altLang="ko-KR" sz="1500" dirty="0" smtClean="0"/>
           </a:p>
           <a:p>
             <a:pPr marL="457200" indent="-457200">
+              <a:lnSpc>
+                <a:spcPct val="150000"/>
+              </a:lnSpc>
               <a:buAutoNum type="arabicPeriod"/>
             </a:pPr>
             <a:r>
-              <a:rPr lang="en-US" altLang="ko-KR" sz="1900" dirty="0" smtClean="0"/>
-              <a:t>Sass</a:t>
-            </a:r>
-            <a:r>
-              <a:rPr lang="ko-KR" altLang="en-US" sz="1900" dirty="0" smtClean="0"/>
-              <a:t>를 사용한다</a:t>
-            </a:r>
-            <a:r>
-              <a:rPr lang="en-US" altLang="ko-KR" sz="1900" dirty="0" smtClean="0"/>
+              <a:rPr lang="ko-KR" altLang="en-US" sz="1300" dirty="0" err="1" smtClean="0"/>
+              <a:t>스네이크</a:t>
+            </a:r>
+            <a:r>
+              <a:rPr lang="ko-KR" altLang="en-US" sz="1300" dirty="0" smtClean="0"/>
+              <a:t> 표기법으로 파일을 명명한다</a:t>
+            </a:r>
+            <a:r>
+              <a:rPr lang="en-US" altLang="ko-KR" sz="1300" dirty="0" smtClean="0"/>
               <a:t>. </a:t>
             </a:r>
+            <a:r>
+              <a:rPr lang="en-US" altLang="ko-KR" sz="1300" dirty="0"/>
+              <a:t>e</a:t>
+            </a:r>
+            <a:r>
+              <a:rPr lang="en-US" altLang="ko-KR" sz="1300" dirty="0" smtClean="0"/>
+              <a:t>x) portfolio_jschoi.pptx / classname_rule.txt</a:t>
+            </a:r>
           </a:p>
           <a:p>
             <a:pPr marL="457200" indent="-457200">
+              <a:lnSpc>
+                <a:spcPct val="150000"/>
+              </a:lnSpc>
               <a:buAutoNum type="arabicPeriod"/>
             </a:pPr>
-            <a:endParaRPr lang="en-US" altLang="ko-KR" sz="1900" dirty="0"/>
+            <a:r>
+              <a:rPr lang="ko-KR" altLang="en-US" sz="1300" dirty="0" smtClean="0"/>
+              <a:t>이미지디렉토리 안 </a:t>
+            </a:r>
+            <a:r>
+              <a:rPr lang="ko-KR" altLang="en-US" sz="1300" dirty="0" err="1" smtClean="0"/>
+              <a:t>폴더명</a:t>
+            </a:r>
+            <a:r>
+              <a:rPr lang="ko-KR" altLang="en-US" sz="1300" dirty="0" smtClean="0"/>
+              <a:t> 또한 </a:t>
+            </a:r>
+            <a:r>
+              <a:rPr lang="ko-KR" altLang="en-US" sz="1300" dirty="0" err="1" smtClean="0"/>
+              <a:t>스네이크</a:t>
+            </a:r>
+            <a:r>
+              <a:rPr lang="ko-KR" altLang="en-US" sz="1300" dirty="0" smtClean="0"/>
+              <a:t> 표기법을 사용하고 해당 이미지 쓰임새에 맞게 명명한다</a:t>
+            </a:r>
+            <a:r>
+              <a:rPr lang="en-US" altLang="ko-KR" sz="1300" dirty="0" smtClean="0"/>
+              <a:t>.</a:t>
+            </a:r>
+          </a:p>
+          <a:p>
+            <a:pPr>
+              <a:lnSpc>
+                <a:spcPct val="150000"/>
+              </a:lnSpc>
+            </a:pPr>
+            <a:r>
+              <a:rPr lang="ko-KR" altLang="en-US" sz="1300" dirty="0" smtClean="0"/>
+              <a:t>큰 범위를 먼저 정의한다</a:t>
+            </a:r>
+            <a:r>
+              <a:rPr lang="en-US" altLang="ko-KR" sz="1300" dirty="0" smtClean="0"/>
+              <a:t>.  ex) sns_github.png</a:t>
+            </a:r>
+          </a:p>
+          <a:p>
+            <a:pPr>
+              <a:lnSpc>
+                <a:spcPct val="150000"/>
+              </a:lnSpc>
+            </a:pPr>
+            <a:endParaRPr lang="en-US" altLang="ko-KR" sz="1500" dirty="0" smtClean="0"/>
+          </a:p>
+          <a:p>
+            <a:pPr>
+              <a:lnSpc>
+                <a:spcPct val="150000"/>
+              </a:lnSpc>
+            </a:pPr>
+            <a:r>
+              <a:rPr lang="en-US" altLang="ko-KR" sz="1500" dirty="0" smtClean="0"/>
+              <a:t>HTML </a:t>
+            </a:r>
+            <a:r>
+              <a:rPr lang="ko-KR" altLang="en-US" sz="1500" dirty="0" smtClean="0"/>
+              <a:t>설정</a:t>
+            </a:r>
+            <a:endParaRPr lang="en-US" altLang="ko-KR" sz="1500" dirty="0" smtClean="0"/>
+          </a:p>
+          <a:p>
+            <a:pPr>
+              <a:lnSpc>
+                <a:spcPct val="150000"/>
+              </a:lnSpc>
+            </a:pPr>
+            <a:r>
+              <a:rPr lang="en-US" altLang="ko-KR" sz="1500" dirty="0" smtClean="0"/>
+              <a:t>1. </a:t>
+            </a:r>
+            <a:r>
+              <a:rPr lang="ko-KR" altLang="en-US" sz="1300" dirty="0" smtClean="0"/>
+              <a:t>모든 주석은 영문으로 한다</a:t>
+            </a:r>
+            <a:r>
+              <a:rPr lang="en-US" altLang="ko-KR" sz="1300" dirty="0" smtClean="0"/>
+              <a:t>. (Sass</a:t>
+            </a:r>
+            <a:r>
+              <a:rPr lang="ko-KR" altLang="en-US" sz="1300" dirty="0" smtClean="0"/>
+              <a:t>를 </a:t>
+            </a:r>
+            <a:r>
+              <a:rPr lang="en-US" altLang="ko-KR" sz="1300" dirty="0" smtClean="0"/>
+              <a:t>CSS</a:t>
+            </a:r>
+            <a:r>
+              <a:rPr lang="ko-KR" altLang="en-US" sz="1300" dirty="0" smtClean="0"/>
+              <a:t>로 </a:t>
+            </a:r>
+            <a:r>
+              <a:rPr lang="ko-KR" altLang="en-US" sz="1300" dirty="0" err="1" smtClean="0"/>
+              <a:t>컴파일시</a:t>
+            </a:r>
+            <a:r>
+              <a:rPr lang="ko-KR" altLang="en-US" sz="1300" dirty="0" smtClean="0"/>
+              <a:t> 발생되는 오류를 최소화 하기 위해</a:t>
+            </a:r>
+            <a:r>
+              <a:rPr lang="en-US" altLang="ko-KR" sz="1300" dirty="0" smtClean="0"/>
+              <a:t>.)</a:t>
+            </a:r>
+          </a:p>
+          <a:p>
+            <a:pPr>
+              <a:lnSpc>
+                <a:spcPct val="150000"/>
+              </a:lnSpc>
+            </a:pPr>
+            <a:endParaRPr lang="en-US" altLang="ko-KR" sz="1500" dirty="0"/>
+          </a:p>
+          <a:p>
+            <a:pPr>
+              <a:lnSpc>
+                <a:spcPct val="150000"/>
+              </a:lnSpc>
+            </a:pPr>
+            <a:r>
+              <a:rPr lang="en-US" altLang="ko-KR" sz="1500" dirty="0" smtClean="0"/>
+              <a:t>CSS </a:t>
+            </a:r>
+            <a:r>
+              <a:rPr lang="ko-KR" altLang="en-US" sz="1500" dirty="0" smtClean="0"/>
+              <a:t>설정</a:t>
+            </a:r>
+            <a:endParaRPr lang="en-US" altLang="ko-KR" sz="1500" dirty="0" smtClean="0"/>
           </a:p>
           <a:p>
             <a:pPr marL="457200" indent="-457200">
+              <a:lnSpc>
+                <a:spcPct val="150000"/>
+              </a:lnSpc>
               <a:buAutoNum type="arabicPeriod"/>
             </a:pPr>
             <a:r>
-              <a:rPr lang="en-US" altLang="ko-KR" sz="1900" dirty="0" smtClean="0"/>
+              <a:rPr lang="en-US" altLang="ko-KR" sz="1300" dirty="0" smtClean="0"/>
+              <a:t>Sass</a:t>
+            </a:r>
+            <a:r>
+              <a:rPr lang="ko-KR" altLang="en-US" sz="1300" dirty="0" smtClean="0"/>
+              <a:t>를 사용한다</a:t>
+            </a:r>
+            <a:r>
+              <a:rPr lang="en-US" altLang="ko-KR" sz="1300" dirty="0" smtClean="0"/>
+              <a:t>. </a:t>
+            </a:r>
+            <a:endParaRPr lang="en-US" altLang="ko-KR" sz="1300" dirty="0"/>
+          </a:p>
+          <a:p>
+            <a:pPr marL="457200" indent="-457200">
+              <a:lnSpc>
+                <a:spcPct val="150000"/>
+              </a:lnSpc>
+              <a:buAutoNum type="arabicPeriod"/>
+            </a:pPr>
+            <a:r>
+              <a:rPr lang="en-US" altLang="ko-KR" sz="1300" dirty="0" smtClean="0"/>
               <a:t> BEM </a:t>
             </a:r>
             <a:r>
-              <a:rPr lang="ko-KR" altLang="en-US" sz="1900" dirty="0" smtClean="0"/>
+              <a:rPr lang="ko-KR" altLang="en-US" sz="1300" dirty="0" smtClean="0"/>
               <a:t>방법론</a:t>
             </a:r>
             <a:r>
-              <a:rPr lang="en-US" altLang="ko-KR" sz="1900" dirty="0" smtClean="0"/>
+              <a:rPr lang="en-US" altLang="ko-KR" sz="1300" dirty="0" smtClean="0">
+                <a:solidFill>
+                  <a:schemeClr val="bg1">
+                    <a:lumMod val="65000"/>
+                  </a:schemeClr>
+                </a:solidFill>
+              </a:rPr>
               <a:t>(</a:t>
             </a:r>
             <a:r>
-              <a:rPr lang="ko-KR" altLang="en-US" sz="1900" dirty="0" smtClean="0"/>
+              <a:rPr lang="ko-KR" altLang="en-US" sz="1300" dirty="0" smtClean="0">
+                <a:solidFill>
+                  <a:schemeClr val="bg1">
+                    <a:lumMod val="65000"/>
+                  </a:schemeClr>
+                </a:solidFill>
+              </a:rPr>
               <a:t>다른 개발자에게 </a:t>
             </a:r>
             <a:r>
-              <a:rPr lang="ko-KR" altLang="en-US" sz="1900" dirty="0" err="1" smtClean="0"/>
+              <a:rPr lang="ko-KR" altLang="en-US" sz="1300" dirty="0" err="1" smtClean="0">
+                <a:solidFill>
+                  <a:schemeClr val="bg1">
+                    <a:lumMod val="65000"/>
+                  </a:schemeClr>
+                </a:solidFill>
+              </a:rPr>
               <a:t>마크업이</a:t>
             </a:r>
             <a:r>
-              <a:rPr lang="ko-KR" altLang="en-US" sz="1900" dirty="0" smtClean="0"/>
+              <a:rPr lang="ko-KR" altLang="en-US" sz="1300" dirty="0" smtClean="0">
+                <a:solidFill>
+                  <a:schemeClr val="bg1">
+                    <a:lumMod val="65000"/>
+                  </a:schemeClr>
+                </a:solidFill>
+              </a:rPr>
               <a:t> 그 이름만으로 무엇을 하고 있는지 </a:t>
             </a:r>
             <a:r>
-              <a:rPr lang="ko-KR" altLang="en-US" sz="1900" dirty="0" err="1" smtClean="0"/>
+              <a:rPr lang="ko-KR" altLang="en-US" sz="1300" dirty="0" err="1" smtClean="0">
+                <a:solidFill>
+                  <a:schemeClr val="bg1">
+                    <a:lumMod val="65000"/>
+                  </a:schemeClr>
+                </a:solidFill>
+              </a:rPr>
               <a:t>알려주는것</a:t>
             </a:r>
             <a:r>
-              <a:rPr lang="en-US" altLang="ko-KR" sz="1900" dirty="0" smtClean="0"/>
+              <a:rPr lang="en-US" altLang="ko-KR" sz="1300" dirty="0" smtClean="0">
+                <a:solidFill>
+                  <a:schemeClr val="bg1">
+                    <a:lumMod val="65000"/>
+                  </a:schemeClr>
+                </a:solidFill>
+              </a:rPr>
               <a:t>. </a:t>
             </a:r>
             <a:r>
-              <a:rPr lang="ko-KR" altLang="en-US" sz="1900" dirty="0" smtClean="0"/>
+              <a:rPr lang="ko-KR" altLang="en-US" sz="1300" dirty="0" smtClean="0">
+                <a:solidFill>
+                  <a:schemeClr val="bg1">
+                    <a:lumMod val="65000"/>
+                  </a:schemeClr>
+                </a:solidFill>
+              </a:rPr>
               <a:t>마치 </a:t>
             </a:r>
             <a:r>
-              <a:rPr lang="en-US" altLang="ko-KR" sz="1900" dirty="0" smtClean="0"/>
+              <a:rPr lang="en-US" altLang="ko-KR" sz="1300" dirty="0" smtClean="0">
+                <a:solidFill>
+                  <a:schemeClr val="bg1">
+                    <a:lumMod val="65000"/>
+                  </a:schemeClr>
+                </a:solidFill>
+              </a:rPr>
               <a:t>html5</a:t>
             </a:r>
             <a:r>
-              <a:rPr lang="ko-KR" altLang="en-US" sz="1900" dirty="0" smtClean="0"/>
+              <a:rPr lang="ko-KR" altLang="en-US" sz="1300" dirty="0" smtClean="0">
+                <a:solidFill>
+                  <a:schemeClr val="bg1">
+                    <a:lumMod val="65000"/>
+                  </a:schemeClr>
+                </a:solidFill>
+              </a:rPr>
               <a:t>에 </a:t>
             </a:r>
             <a:r>
-              <a:rPr lang="ko-KR" altLang="en-US" sz="1900" dirty="0" err="1" smtClean="0"/>
+              <a:rPr lang="ko-KR" altLang="en-US" sz="1300" dirty="0" err="1" smtClean="0">
+                <a:solidFill>
+                  <a:schemeClr val="bg1">
+                    <a:lumMod val="65000"/>
+                  </a:schemeClr>
+                </a:solidFill>
+              </a:rPr>
               <a:t>시멘틱태그와</a:t>
             </a:r>
             <a:r>
-              <a:rPr lang="ko-KR" altLang="en-US" sz="1900" dirty="0" smtClean="0"/>
+              <a:rPr lang="ko-KR" altLang="en-US" sz="1300" dirty="0" smtClean="0">
+                <a:solidFill>
+                  <a:schemeClr val="bg1">
+                    <a:lumMod val="65000"/>
+                  </a:schemeClr>
+                </a:solidFill>
+              </a:rPr>
               <a:t> 연관되는 방법론</a:t>
             </a:r>
             <a:r>
-              <a:rPr lang="en-US" altLang="ko-KR" sz="1900" dirty="0" smtClean="0"/>
+              <a:rPr lang="en-US" altLang="ko-KR" sz="1300" dirty="0" smtClean="0">
+                <a:solidFill>
+                  <a:schemeClr val="bg1">
+                    <a:lumMod val="65000"/>
+                  </a:schemeClr>
+                </a:solidFill>
+              </a:rPr>
               <a:t>)</a:t>
             </a:r>
             <a:r>
-              <a:rPr lang="ko-KR" altLang="en-US" sz="1900" dirty="0" smtClean="0"/>
+              <a:rPr lang="ko-KR" altLang="en-US" sz="1300" dirty="0" smtClean="0"/>
               <a:t>과 </a:t>
             </a:r>
             <a:r>
-              <a:rPr lang="en-US" altLang="ko-KR" sz="1900" dirty="0" smtClean="0"/>
+              <a:rPr lang="en-US" altLang="ko-KR" sz="1300" dirty="0" smtClean="0"/>
               <a:t>OOCSS</a:t>
             </a:r>
             <a:r>
-              <a:rPr lang="ko-KR" altLang="en-US" sz="1900" dirty="0" smtClean="0"/>
+              <a:rPr lang="ko-KR" altLang="en-US" sz="1300" dirty="0" smtClean="0"/>
               <a:t>방법론</a:t>
             </a:r>
             <a:r>
-              <a:rPr lang="en-US" altLang="ko-KR" sz="1900" dirty="0" smtClean="0"/>
+              <a:rPr lang="en-US" altLang="ko-KR" sz="1300" dirty="0" smtClean="0">
+                <a:solidFill>
+                  <a:schemeClr val="bg1">
+                    <a:lumMod val="65000"/>
+                  </a:schemeClr>
+                </a:solidFill>
+              </a:rPr>
               <a:t>(</a:t>
             </a:r>
             <a:r>
-              <a:rPr lang="ko-KR" altLang="en-US" sz="1900" dirty="0" smtClean="0"/>
+              <a:rPr lang="ko-KR" altLang="en-US" sz="1300" dirty="0" smtClean="0">
+                <a:solidFill>
+                  <a:schemeClr val="bg1">
+                    <a:lumMod val="65000"/>
+                  </a:schemeClr>
+                </a:solidFill>
+              </a:rPr>
               <a:t>미디어류의 사이트를 만들 때 유용하게 쓰인다</a:t>
             </a:r>
             <a:r>
-              <a:rPr lang="en-US" altLang="ko-KR" sz="1900" dirty="0" smtClean="0"/>
+              <a:rPr lang="en-US" altLang="ko-KR" sz="1300" dirty="0" smtClean="0">
+                <a:solidFill>
+                  <a:schemeClr val="bg1">
+                    <a:lumMod val="65000"/>
+                  </a:schemeClr>
+                </a:solidFill>
+              </a:rPr>
               <a:t>. </a:t>
             </a:r>
             <a:r>
-              <a:rPr lang="ko-KR" altLang="en-US" sz="1900" dirty="0" smtClean="0"/>
+              <a:rPr lang="ko-KR" altLang="en-US" sz="1300" dirty="0" smtClean="0">
+                <a:solidFill>
+                  <a:schemeClr val="bg1">
+                    <a:lumMod val="65000"/>
+                  </a:schemeClr>
+                </a:solidFill>
+              </a:rPr>
               <a:t>하지만</a:t>
             </a:r>
             <a:r>
-              <a:rPr lang="en-US" altLang="ko-KR" sz="1900" dirty="0" smtClean="0"/>
+              <a:rPr lang="en-US" altLang="ko-KR" sz="1300" dirty="0" smtClean="0">
+                <a:solidFill>
+                  <a:schemeClr val="bg1">
+                    <a:lumMod val="65000"/>
+                  </a:schemeClr>
+                </a:solidFill>
+              </a:rPr>
               <a:t>, </a:t>
             </a:r>
             <a:r>
-              <a:rPr lang="ko-KR" altLang="en-US" sz="1900" dirty="0" smtClean="0"/>
+              <a:rPr lang="ko-KR" altLang="en-US" sz="1300" dirty="0" smtClean="0">
+                <a:solidFill>
+                  <a:schemeClr val="bg1">
+                    <a:lumMod val="65000"/>
+                  </a:schemeClr>
+                </a:solidFill>
+              </a:rPr>
               <a:t>관계를 </a:t>
             </a:r>
             <a:r>
-              <a:rPr lang="ko-KR" altLang="en-US" sz="1900" dirty="0" err="1" smtClean="0"/>
+              <a:rPr lang="ko-KR" altLang="en-US" sz="1300" dirty="0" err="1" smtClean="0">
+                <a:solidFill>
+                  <a:schemeClr val="bg1">
+                    <a:lumMod val="65000"/>
+                  </a:schemeClr>
+                </a:solidFill>
+              </a:rPr>
               <a:t>볼때</a:t>
             </a:r>
             <a:r>
-              <a:rPr lang="ko-KR" altLang="en-US" sz="1900" dirty="0" smtClean="0"/>
+              <a:rPr lang="ko-KR" altLang="en-US" sz="1300" dirty="0" smtClean="0">
+                <a:solidFill>
+                  <a:schemeClr val="bg1">
+                    <a:lumMod val="65000"/>
+                  </a:schemeClr>
+                </a:solidFill>
+              </a:rPr>
               <a:t> 이 클래스가 어디에 속하는지는 알 수 없다</a:t>
             </a:r>
             <a:r>
-              <a:rPr lang="en-US" altLang="ko-KR" sz="1900" dirty="0" smtClean="0"/>
+              <a:rPr lang="en-US" altLang="ko-KR" sz="1300" dirty="0" smtClean="0">
+                <a:solidFill>
+                  <a:schemeClr val="bg1">
+                    <a:lumMod val="65000"/>
+                  </a:schemeClr>
+                </a:solidFill>
+              </a:rPr>
               <a:t>. </a:t>
             </a:r>
             <a:r>
-              <a:rPr lang="ko-KR" altLang="en-US" sz="1900" dirty="0" smtClean="0"/>
+              <a:rPr lang="ko-KR" altLang="en-US" sz="1300" dirty="0" smtClean="0">
+                <a:solidFill>
+                  <a:schemeClr val="bg1">
+                    <a:lumMod val="65000"/>
+                  </a:schemeClr>
+                </a:solidFill>
+              </a:rPr>
               <a:t>중복되는 스타일을 따로 빼내어 클래스를 만들어 반복적으로 사용한다</a:t>
             </a:r>
             <a:r>
-              <a:rPr lang="en-US" altLang="ko-KR" sz="1900" dirty="0" smtClean="0"/>
+              <a:rPr lang="en-US" altLang="ko-KR" sz="1300" dirty="0" smtClean="0">
+                <a:solidFill>
+                  <a:schemeClr val="bg1">
+                    <a:lumMod val="65000"/>
+                  </a:schemeClr>
+                </a:solidFill>
+              </a:rPr>
               <a:t>. </a:t>
             </a:r>
             <a:r>
-              <a:rPr lang="ko-KR" altLang="en-US" sz="1900" dirty="0" err="1" smtClean="0"/>
+              <a:rPr lang="ko-KR" altLang="en-US" sz="1300" dirty="0" err="1" smtClean="0">
+                <a:solidFill>
+                  <a:schemeClr val="bg1">
+                    <a:lumMod val="65000"/>
+                  </a:schemeClr>
+                </a:solidFill>
+              </a:rPr>
               <a:t>마크업에서</a:t>
             </a:r>
             <a:r>
-              <a:rPr lang="ko-KR" altLang="en-US" sz="1900" dirty="0" smtClean="0"/>
+              <a:rPr lang="ko-KR" altLang="en-US" sz="1300" dirty="0" smtClean="0">
+                <a:solidFill>
+                  <a:schemeClr val="bg1">
+                    <a:lumMod val="65000"/>
+                  </a:schemeClr>
+                </a:solidFill>
+              </a:rPr>
               <a:t> 동일한 클래스를 </a:t>
             </a:r>
             <a:r>
-              <a:rPr lang="ko-KR" altLang="en-US" sz="1900" dirty="0" err="1" smtClean="0"/>
+              <a:rPr lang="ko-KR" altLang="en-US" sz="1300" dirty="0" err="1" smtClean="0">
+                <a:solidFill>
+                  <a:schemeClr val="bg1">
+                    <a:lumMod val="65000"/>
+                  </a:schemeClr>
+                </a:solidFill>
+              </a:rPr>
               <a:t>여러곳에</a:t>
             </a:r>
             <a:r>
-              <a:rPr lang="ko-KR" altLang="en-US" sz="1900" dirty="0" smtClean="0"/>
+              <a:rPr lang="ko-KR" altLang="en-US" sz="1300" dirty="0" smtClean="0">
+                <a:solidFill>
+                  <a:schemeClr val="bg1">
+                    <a:lumMod val="65000"/>
+                  </a:schemeClr>
+                </a:solidFill>
+              </a:rPr>
               <a:t> 사용하므로 코드가 지저분해 지는 단점이 있다</a:t>
             </a:r>
             <a:r>
-              <a:rPr lang="en-US" altLang="ko-KR" sz="1900" dirty="0" smtClean="0"/>
-              <a:t>.__ </a:t>
-            </a:r>
-            <a:r>
-              <a:rPr lang="ko-KR" altLang="en-US" sz="1900" dirty="0" err="1" smtClean="0"/>
-              <a:t>이단점을</a:t>
-            </a:r>
-            <a:r>
-              <a:rPr lang="ko-KR" altLang="en-US" sz="1900" dirty="0" smtClean="0"/>
-              <a:t> 보완한 것이 </a:t>
-            </a:r>
-            <a:r>
-              <a:rPr lang="en-US" altLang="ko-KR" sz="1900" dirty="0" smtClean="0"/>
-              <a:t>OOCSS</a:t>
-            </a:r>
-            <a:r>
-              <a:rPr lang="ko-KR" altLang="en-US" sz="1900" dirty="0" smtClean="0"/>
-              <a:t>로</a:t>
-            </a:r>
-            <a:r>
-              <a:rPr lang="en-US" altLang="ko-KR" sz="1900" dirty="0" smtClean="0"/>
-              <a:t>, </a:t>
-            </a:r>
-            <a:r>
-              <a:rPr lang="ko-KR" altLang="en-US" sz="1900" dirty="0" err="1" smtClean="0"/>
-              <a:t>마크업의</a:t>
-            </a:r>
-            <a:r>
-              <a:rPr lang="ko-KR" altLang="en-US" sz="1900" dirty="0" smtClean="0"/>
-              <a:t> 복잡함을 </a:t>
-            </a:r>
-            <a:r>
-              <a:rPr lang="ko-KR" altLang="en-US" sz="1900" dirty="0" err="1" smtClean="0"/>
-              <a:t>프리프로세서</a:t>
-            </a:r>
-            <a:r>
-              <a:rPr lang="ko-KR" altLang="en-US" sz="1900" dirty="0" smtClean="0"/>
-              <a:t> 내에서 대신 처리한다</a:t>
-            </a:r>
-            <a:r>
-              <a:rPr lang="en-US" altLang="ko-KR" sz="1900" dirty="0" smtClean="0"/>
+              <a:rPr lang="en-US" altLang="ko-KR" sz="1300" dirty="0" smtClean="0">
+                <a:solidFill>
+                  <a:schemeClr val="bg1">
+                    <a:lumMod val="65000"/>
+                  </a:schemeClr>
+                </a:solidFill>
+              </a:rPr>
               <a:t>.)</a:t>
             </a:r>
             <a:r>
-              <a:rPr lang="ko-KR" altLang="en-US" sz="1900" dirty="0" smtClean="0"/>
+              <a:rPr lang="ko-KR" altLang="en-US" sz="1300" dirty="0" smtClean="0"/>
               <a:t>을 사용하여 스타일을 설정한다</a:t>
             </a:r>
             <a:r>
-              <a:rPr lang="en-US" altLang="ko-KR" sz="1900" dirty="0" smtClean="0"/>
+              <a:rPr lang="en-US" altLang="ko-KR" sz="1300" dirty="0" smtClean="0"/>
               <a:t>. </a:t>
             </a:r>
-            <a:endParaRPr lang="en-US" altLang="ko-KR" sz="1900" dirty="0"/>
-          </a:p>
-          <a:p>
-            <a:r>
-              <a:rPr lang="en-US" altLang="ko-KR" sz="1900" dirty="0" err="1" smtClean="0"/>
-              <a:t>Airbnb</a:t>
-            </a:r>
-            <a:r>
-              <a:rPr lang="en-US" altLang="ko-KR" sz="1900" dirty="0" smtClean="0"/>
+            <a:endParaRPr lang="en-US" altLang="ko-KR" sz="1300" dirty="0"/>
+          </a:p>
+          <a:p>
+            <a:pPr lvl="1">
+              <a:lnSpc>
+                <a:spcPct val="150000"/>
+              </a:lnSpc>
+            </a:pPr>
+            <a:r>
+              <a:rPr lang="en-US" altLang="ko-KR" sz="1300" dirty="0" smtClean="0"/>
+              <a:t>Airbnb </a:t>
+            </a:r>
+            <a:r>
+              <a:rPr lang="en-US" altLang="ko-KR" sz="1300" dirty="0" err="1" smtClean="0"/>
+              <a:t>css</a:t>
+            </a:r>
+            <a:r>
+              <a:rPr lang="ko-KR" altLang="en-US" sz="1300" dirty="0"/>
               <a:t> </a:t>
             </a:r>
             <a:r>
-              <a:rPr lang="en-US" altLang="ko-KR" sz="1900" dirty="0" err="1" smtClean="0"/>
-              <a:t>css</a:t>
-            </a:r>
-            <a:r>
-              <a:rPr lang="ko-KR" altLang="en-US" sz="1900" dirty="0" smtClean="0"/>
-              <a:t>에 착안</a:t>
-            </a:r>
-            <a:endParaRPr lang="en-US" altLang="ko-KR" sz="1900" dirty="0" smtClean="0"/>
-          </a:p>
-          <a:p>
-            <a:r>
-              <a:rPr lang="ko-KR" altLang="en-US" sz="1900" dirty="0" smtClean="0"/>
+              <a:rPr lang="ko-KR" altLang="en-US" sz="1300" dirty="0" smtClean="0"/>
               <a:t>참고 </a:t>
             </a:r>
             <a:r>
-              <a:rPr lang="en-US" altLang="ko-KR" sz="1900" dirty="0"/>
+              <a:rPr lang="en-US" altLang="ko-KR" sz="1300" dirty="0"/>
               <a:t>(</a:t>
             </a:r>
             <a:r>
-              <a:rPr lang="en-US" altLang="ko-KR" sz="1900" dirty="0">
+              <a:rPr lang="en-US" altLang="ko-KR" sz="1300" dirty="0">
                 <a:hlinkClick r:id="rId2"/>
               </a:rPr>
               <a:t>https://github.com/celinechoi/css</a:t>
             </a:r>
             <a:r>
-              <a:rPr lang="en-US" altLang="ko-KR" sz="1900" dirty="0" smtClean="0"/>
+              <a:rPr lang="en-US" altLang="ko-KR" sz="1300" dirty="0" smtClean="0"/>
               <a:t>)</a:t>
             </a:r>
           </a:p>
           <a:p>
-            <a:r>
-              <a:rPr lang="en-US" altLang="ko-KR" sz="1900" dirty="0" err="1" smtClean="0"/>
+            <a:pPr lvl="1">
+              <a:lnSpc>
+                <a:spcPct val="150000"/>
+              </a:lnSpc>
+            </a:pPr>
+            <a:r>
+              <a:rPr lang="en-US" altLang="ko-KR" sz="1300" dirty="0" smtClean="0"/>
+              <a:t>-    Tab</a:t>
+            </a:r>
+            <a:r>
+              <a:rPr lang="ko-KR" altLang="en-US" sz="1300" dirty="0" smtClean="0"/>
+              <a:t>대신 띄어쓰기 </a:t>
+            </a:r>
+            <a:r>
+              <a:rPr lang="en-US" altLang="ko-KR" sz="1300" dirty="0" smtClean="0"/>
+              <a:t>2</a:t>
+            </a:r>
+            <a:r>
+              <a:rPr lang="ko-KR" altLang="en-US" sz="1300" dirty="0" smtClean="0"/>
+              <a:t>칸을 사용한다</a:t>
+            </a:r>
+            <a:r>
+              <a:rPr lang="en-US" altLang="ko-KR" sz="1300" dirty="0" smtClean="0"/>
+              <a:t>.</a:t>
+            </a:r>
+          </a:p>
+          <a:p>
+            <a:pPr marL="742950" lvl="1" indent="-285750">
+              <a:lnSpc>
+                <a:spcPct val="150000"/>
+              </a:lnSpc>
+              <a:buFontTx/>
+              <a:buChar char="-"/>
+            </a:pPr>
+            <a:r>
+              <a:rPr lang="ko-KR" altLang="en-US" sz="1300" dirty="0" smtClean="0"/>
+              <a:t>클래스를 </a:t>
+            </a:r>
+            <a:r>
+              <a:rPr lang="ko-KR" altLang="en-US" sz="1300" dirty="0" err="1" smtClean="0"/>
+              <a:t>명명시</a:t>
+            </a:r>
+            <a:r>
+              <a:rPr lang="en-US" altLang="ko-KR" sz="1300" dirty="0" smtClean="0"/>
+              <a:t>, </a:t>
+            </a:r>
+            <a:r>
+              <a:rPr lang="ko-KR" altLang="en-US" sz="1300" dirty="0" smtClean="0"/>
+              <a:t>파스칼표기법을 사용하고 직관적이게 명명한다</a:t>
+            </a:r>
+            <a:r>
+              <a:rPr lang="en-US" altLang="ko-KR" sz="1300" dirty="0" smtClean="0"/>
+              <a:t>. </a:t>
+            </a:r>
+            <a:r>
+              <a:rPr lang="ko-KR" altLang="en-US" sz="1300" dirty="0" smtClean="0"/>
+              <a:t>또한 유지보수</a:t>
+            </a:r>
+            <a:r>
+              <a:rPr lang="en-US" altLang="ko-KR" sz="1300" dirty="0" smtClean="0"/>
+              <a:t>(represents)</a:t>
+            </a:r>
+            <a:r>
+              <a:rPr lang="ko-KR" altLang="en-US" sz="1300" dirty="0" smtClean="0"/>
+              <a:t>시</a:t>
+            </a:r>
+            <a:r>
+              <a:rPr lang="en-US" altLang="ko-KR" sz="1300" dirty="0" smtClean="0"/>
+              <a:t>, ‘--featured’</a:t>
+            </a:r>
+            <a:r>
+              <a:rPr lang="ko-KR" altLang="en-US" sz="1300" dirty="0" smtClean="0"/>
+              <a:t>를 덧붙여 클래스를 추가한다</a:t>
+            </a:r>
+            <a:r>
+              <a:rPr lang="en-US" altLang="ko-KR" sz="1300" dirty="0" smtClean="0"/>
+              <a:t>.</a:t>
+            </a:r>
+          </a:p>
+          <a:p>
+            <a:pPr marL="742950" lvl="1" indent="-285750">
+              <a:lnSpc>
+                <a:spcPct val="150000"/>
+              </a:lnSpc>
+              <a:buFontTx/>
+              <a:buChar char="-"/>
+            </a:pPr>
+            <a:r>
+              <a:rPr lang="en-US" altLang="ko-KR" sz="1300" dirty="0" smtClean="0"/>
+              <a:t>OOCSS</a:t>
+            </a:r>
+            <a:r>
+              <a:rPr lang="ko-KR" altLang="en-US" sz="1300" dirty="0" smtClean="0"/>
+              <a:t>방법론을 참고하여 공통된 스타일은 한데 묶어 하나의 </a:t>
+            </a:r>
+            <a:r>
+              <a:rPr lang="ko-KR" altLang="en-US" sz="1300" dirty="0" err="1" smtClean="0"/>
+              <a:t>클래스명을</a:t>
+            </a:r>
+            <a:r>
+              <a:rPr lang="ko-KR" altLang="en-US" sz="1300" dirty="0" smtClean="0"/>
+              <a:t> 사용한다</a:t>
+            </a:r>
+            <a:r>
+              <a:rPr lang="en-US" altLang="ko-KR" sz="1300" dirty="0" smtClean="0"/>
+              <a:t>.</a:t>
+            </a:r>
+          </a:p>
+          <a:p>
+            <a:pPr lvl="1">
+              <a:lnSpc>
+                <a:spcPct val="150000"/>
+              </a:lnSpc>
+            </a:pPr>
+            <a:r>
+              <a:rPr lang="en-US" altLang="ko-KR" sz="1300" dirty="0" err="1" smtClean="0"/>
               <a:t>Bem</a:t>
             </a:r>
             <a:r>
-              <a:rPr lang="ko-KR" altLang="en-US" sz="1900" dirty="0" smtClean="0"/>
+              <a:rPr lang="ko-KR" altLang="en-US" sz="1300" dirty="0" smtClean="0"/>
               <a:t>과 </a:t>
             </a:r>
             <a:r>
-              <a:rPr lang="en-US" altLang="ko-KR" sz="1900" dirty="0" smtClean="0"/>
+              <a:rPr lang="en-US" altLang="ko-KR" sz="1300" dirty="0" smtClean="0"/>
               <a:t>OOCSS</a:t>
             </a:r>
             <a:r>
-              <a:rPr lang="ko-KR" altLang="en-US" sz="1900" dirty="0" smtClean="0"/>
+              <a:rPr lang="ko-KR" altLang="en-US" sz="1300" dirty="0" smtClean="0"/>
               <a:t>방법론 차이 설명 참고 </a:t>
             </a:r>
             <a:r>
-              <a:rPr lang="en-US" altLang="ko-KR" sz="1900" dirty="0"/>
+              <a:rPr lang="en-US" altLang="ko-KR" sz="1300" dirty="0"/>
               <a:t>(</a:t>
             </a:r>
             <a:r>
-              <a:rPr lang="en-US" altLang="ko-KR" sz="1900" dirty="0">
+              <a:rPr lang="en-US" altLang="ko-KR" sz="1300" dirty="0">
                 <a:hlinkClick r:id="rId3"/>
               </a:rPr>
-              <a:t>https://gomdoreepooh.github.io/notes/smacss-bem-oocss</a:t>
-            </a:r>
-            <a:r>
-              <a:rPr lang="en-US" altLang="ko-KR" sz="1900" dirty="0"/>
-              <a:t>)</a:t>
-            </a:r>
-            <a:endParaRPr lang="en-US" altLang="ko-KR" sz="1900" dirty="0" smtClean="0"/>
-          </a:p>
-          <a:p>
-            <a:r>
-              <a:rPr lang="en-US" altLang="ko-KR" sz="1900" dirty="0" err="1" smtClean="0"/>
-              <a:t>Bem</a:t>
-            </a:r>
-            <a:r>
-              <a:rPr lang="ko-KR" altLang="en-US" sz="1900" dirty="0" smtClean="0"/>
-              <a:t>방법론 참고 </a:t>
-            </a:r>
-            <a:r>
-              <a:rPr lang="en-US" altLang="ko-KR" sz="1900" dirty="0"/>
-              <a:t>(</a:t>
-            </a:r>
-            <a:r>
-              <a:rPr lang="en-US" altLang="ko-KR" sz="1900" dirty="0">
+              <a:t>https://</a:t>
+            </a:r>
+            <a:r>
+              <a:rPr lang="en-US" altLang="ko-KR" sz="1300" dirty="0" smtClean="0">
+                <a:hlinkClick r:id="rId3"/>
+              </a:rPr>
+              <a:t>gomdoreepooh.github.io/notes/smacss-bem-oocss</a:t>
+            </a:r>
+            <a:r>
+              <a:rPr lang="en-US" altLang="ko-KR" sz="1300" dirty="0" smtClean="0"/>
+              <a:t> </a:t>
+            </a:r>
+            <a:r>
+              <a:rPr lang="en-US" altLang="ko-KR" sz="1300" dirty="0" smtClean="0">
                 <a:hlinkClick r:id="rId4"/>
               </a:rPr>
-              <a:t>https://css-tricks.com/bem-101/</a:t>
-            </a:r>
-            <a:r>
-              <a:rPr lang="en-US" altLang="ko-KR" sz="1900" dirty="0"/>
+              <a:t>http</a:t>
+            </a:r>
+            <a:r>
+              <a:rPr lang="en-US" altLang="ko-KR" sz="1300" dirty="0">
+                <a:hlinkClick r:id="rId4"/>
+              </a:rPr>
+              <a:t>://wit.nts-corp.com/2015/04/16/3538</a:t>
+            </a:r>
+            <a:r>
+              <a:rPr lang="en-US" altLang="ko-KR" sz="1300" dirty="0"/>
               <a:t>)</a:t>
             </a:r>
-            <a:endParaRPr lang="ko-KR" altLang="en-US" sz="1900" dirty="0"/>
+            <a:endParaRPr lang="en-US" altLang="ko-KR" sz="1300" dirty="0" smtClean="0"/>
+          </a:p>
+          <a:p>
+            <a:pPr lvl="1">
+              <a:lnSpc>
+                <a:spcPct val="150000"/>
+              </a:lnSpc>
+            </a:pPr>
+            <a:r>
+              <a:rPr lang="en-US" altLang="ko-KR" sz="1300" dirty="0" err="1" smtClean="0"/>
+              <a:t>Bem</a:t>
+            </a:r>
+            <a:r>
+              <a:rPr lang="ko-KR" altLang="en-US" sz="1300" dirty="0" smtClean="0"/>
+              <a:t>방법론 참고 </a:t>
+            </a:r>
+            <a:r>
+              <a:rPr lang="en-US" altLang="ko-KR" sz="1300" dirty="0"/>
+              <a:t>(</a:t>
+            </a:r>
+            <a:r>
+              <a:rPr lang="en-US" altLang="ko-KR" sz="1300" dirty="0">
+                <a:hlinkClick r:id="rId5"/>
+              </a:rPr>
+              <a:t>https://css-tricks.com/bem-101</a:t>
+            </a:r>
+            <a:r>
+              <a:rPr lang="en-US" altLang="ko-KR" sz="1300" dirty="0" smtClean="0">
+                <a:hlinkClick r:id="rId5"/>
+              </a:rPr>
+              <a:t>/</a:t>
+            </a:r>
+            <a:r>
+              <a:rPr lang="en-US" altLang="ko-KR" sz="1300" dirty="0" smtClean="0"/>
+              <a:t>)</a:t>
+            </a:r>
+          </a:p>
+          <a:p>
+            <a:pPr lvl="1">
+              <a:lnSpc>
+                <a:spcPct val="150000"/>
+              </a:lnSpc>
+            </a:pPr>
+            <a:r>
+              <a:rPr lang="en-US" altLang="ko-KR" sz="1300" dirty="0" smtClean="0"/>
+              <a:t>3. </a:t>
+            </a:r>
+            <a:r>
+              <a:rPr lang="en-US" altLang="ko-KR" sz="1300" dirty="0" err="1" smtClean="0"/>
+              <a:t>mixin</a:t>
+            </a:r>
+            <a:r>
+              <a:rPr lang="ko-KR" altLang="en-US" sz="1300" dirty="0" smtClean="0"/>
+              <a:t>방식과 </a:t>
+            </a:r>
+            <a:r>
+              <a:rPr lang="en-US" altLang="ko-KR" sz="1300" dirty="0" smtClean="0"/>
+              <a:t>extend</a:t>
+            </a:r>
+            <a:r>
+              <a:rPr lang="ko-KR" altLang="en-US" sz="1300" dirty="0" smtClean="0"/>
+              <a:t>방식 활용</a:t>
+            </a:r>
+            <a:r>
+              <a:rPr lang="en-US" altLang="ko-KR" sz="1300" dirty="0" smtClean="0"/>
+              <a:t>.</a:t>
+            </a:r>
+          </a:p>
+          <a:p>
+            <a:pPr lvl="1">
+              <a:lnSpc>
+                <a:spcPct val="150000"/>
+              </a:lnSpc>
+            </a:pPr>
+            <a:r>
+              <a:rPr lang="en-US" altLang="ko-KR" sz="1300" dirty="0" smtClean="0">
+                <a:hlinkClick r:id="rId4"/>
+              </a:rPr>
+              <a:t>(http</a:t>
+            </a:r>
+            <a:r>
+              <a:rPr lang="en-US" altLang="ko-KR" sz="1300" dirty="0">
+                <a:hlinkClick r:id="rId4"/>
+              </a:rPr>
+              <a:t>://</a:t>
+            </a:r>
+            <a:r>
+              <a:rPr lang="en-US" altLang="ko-KR" sz="1300" dirty="0" smtClean="0">
+                <a:hlinkClick r:id="rId4"/>
+              </a:rPr>
+              <a:t>wit.nts-corp.com/2015/04/16/3538</a:t>
+            </a:r>
+            <a:r>
+              <a:rPr lang="en-US" altLang="ko-KR" sz="1300" dirty="0" smtClean="0"/>
+              <a:t>)</a:t>
+            </a:r>
+          </a:p>
+          <a:p>
+            <a:pPr lvl="1">
+              <a:lnSpc>
+                <a:spcPct val="150000"/>
+              </a:lnSpc>
+            </a:pPr>
+            <a:r>
+              <a:rPr lang="en-US" altLang="ko-KR" sz="1300" dirty="0" err="1" smtClean="0"/>
+              <a:t>Mixin</a:t>
+            </a:r>
+            <a:r>
+              <a:rPr lang="ko-KR" altLang="en-US" sz="1300" dirty="0" smtClean="0"/>
+              <a:t>을 사용하여 컴파일 할 경우 </a:t>
+            </a:r>
+            <a:r>
+              <a:rPr lang="ko-KR" altLang="en-US" sz="1300" dirty="0" err="1" smtClean="0"/>
+              <a:t>중복코드가</a:t>
+            </a:r>
+            <a:r>
+              <a:rPr lang="ko-KR" altLang="en-US" sz="1300" dirty="0" smtClean="0"/>
+              <a:t> 발생하기 때문에 컴파일 했을 시 중복이 최소화 되는 </a:t>
+            </a:r>
+            <a:r>
+              <a:rPr lang="en-US" altLang="ko-KR" sz="1300" dirty="0" smtClean="0"/>
+              <a:t>extend</a:t>
+            </a:r>
+            <a:r>
+              <a:rPr lang="ko-KR" altLang="en-US" sz="1300" dirty="0" smtClean="0"/>
+              <a:t>방식을 활용한다</a:t>
+            </a:r>
+            <a:r>
+              <a:rPr lang="en-US" altLang="ko-KR" sz="1300" smtClean="0"/>
+              <a:t>.</a:t>
+            </a:r>
+            <a:endParaRPr lang="en-US" altLang="ko-KR" sz="1300" dirty="0" smtClean="0"/>
+          </a:p>
+          <a:p>
+            <a:pPr lvl="1"/>
+            <a:endParaRPr lang="ko-KR" altLang="en-US" sz="1700" dirty="0"/>
           </a:p>
         </p:txBody>
       </p:sp>

</xml_diff>